<commit_message>
Updates to Harshal-Survey power point
</commit_message>
<xml_diff>
--- a/Harshal-Mahangare-Survey-PPT/Authentication mechanisms for Internet of Things (IOT.pptx
+++ b/Harshal-Mahangare-Survey-PPT/Authentication mechanisms for Internet of Things (IOT.pptx
@@ -8,8 +8,11 @@
     <p:sldId id="257" r:id="rId2"/>
     <p:sldId id="256" r:id="rId3"/>
     <p:sldId id="258" r:id="rId4"/>
-    <p:sldId id="260" r:id="rId5"/>
-    <p:sldId id="259" r:id="rId6"/>
+    <p:sldId id="261" r:id="rId5"/>
+    <p:sldId id="260" r:id="rId6"/>
+    <p:sldId id="259" r:id="rId7"/>
+    <p:sldId id="262" r:id="rId8"/>
+    <p:sldId id="263" r:id="rId9"/>
   </p:sldIdLst>
   <p:sldSz cx="12192000" cy="6858000"/>
   <p:notesSz cx="6858000" cy="9144000"/>
@@ -108,6 +111,11 @@
       </a:defRPr>
     </a:lvl9pPr>
   </p:defaultTextStyle>
+  <p:extLst>
+    <p:ext uri="{EFAFB233-063F-42B5-8137-9DF3F51BA10A}">
+      <p15:sldGuideLst xmlns:p15="http://schemas.microsoft.com/office/powerpoint/2012/main"/>
+    </p:ext>
+  </p:extLst>
 </p:presentation>
 </file>
 
@@ -242,7 +250,7 @@
           <a:p>
             <a:fld id="{71B7A74D-6684-439E-81C1-4806B1B6E780}" type="datetimeFigureOut">
               <a:rPr lang="en-US" smtClean="0"/>
-              <a:t>11/28/2015</a:t>
+              <a:t>11/30/2015</a:t>
             </a:fld>
             <a:endParaRPr lang="en-US"/>
           </a:p>
@@ -412,7 +420,7 @@
           <a:p>
             <a:fld id="{71B7A74D-6684-439E-81C1-4806B1B6E780}" type="datetimeFigureOut">
               <a:rPr lang="en-US" smtClean="0"/>
-              <a:t>11/28/2015</a:t>
+              <a:t>11/30/2015</a:t>
             </a:fld>
             <a:endParaRPr lang="en-US"/>
           </a:p>
@@ -592,7 +600,7 @@
           <a:p>
             <a:fld id="{71B7A74D-6684-439E-81C1-4806B1B6E780}" type="datetimeFigureOut">
               <a:rPr lang="en-US" smtClean="0"/>
-              <a:t>11/28/2015</a:t>
+              <a:t>11/30/2015</a:t>
             </a:fld>
             <a:endParaRPr lang="en-US"/>
           </a:p>
@@ -762,7 +770,7 @@
           <a:p>
             <a:fld id="{71B7A74D-6684-439E-81C1-4806B1B6E780}" type="datetimeFigureOut">
               <a:rPr lang="en-US" smtClean="0"/>
-              <a:t>11/28/2015</a:t>
+              <a:t>11/30/2015</a:t>
             </a:fld>
             <a:endParaRPr lang="en-US"/>
           </a:p>
@@ -1008,7 +1016,7 @@
           <a:p>
             <a:fld id="{71B7A74D-6684-439E-81C1-4806B1B6E780}" type="datetimeFigureOut">
               <a:rPr lang="en-US" smtClean="0"/>
-              <a:t>11/28/2015</a:t>
+              <a:t>11/30/2015</a:t>
             </a:fld>
             <a:endParaRPr lang="en-US"/>
           </a:p>
@@ -1240,7 +1248,7 @@
           <a:p>
             <a:fld id="{71B7A74D-6684-439E-81C1-4806B1B6E780}" type="datetimeFigureOut">
               <a:rPr lang="en-US" smtClean="0"/>
-              <a:t>11/28/2015</a:t>
+              <a:t>11/30/2015</a:t>
             </a:fld>
             <a:endParaRPr lang="en-US"/>
           </a:p>
@@ -1607,7 +1615,7 @@
           <a:p>
             <a:fld id="{71B7A74D-6684-439E-81C1-4806B1B6E780}" type="datetimeFigureOut">
               <a:rPr lang="en-US" smtClean="0"/>
-              <a:t>11/28/2015</a:t>
+              <a:t>11/30/2015</a:t>
             </a:fld>
             <a:endParaRPr lang="en-US"/>
           </a:p>
@@ -1725,7 +1733,7 @@
           <a:p>
             <a:fld id="{71B7A74D-6684-439E-81C1-4806B1B6E780}" type="datetimeFigureOut">
               <a:rPr lang="en-US" smtClean="0"/>
-              <a:t>11/28/2015</a:t>
+              <a:t>11/30/2015</a:t>
             </a:fld>
             <a:endParaRPr lang="en-US"/>
           </a:p>
@@ -1820,7 +1828,7 @@
           <a:p>
             <a:fld id="{71B7A74D-6684-439E-81C1-4806B1B6E780}" type="datetimeFigureOut">
               <a:rPr lang="en-US" smtClean="0"/>
-              <a:t>11/28/2015</a:t>
+              <a:t>11/30/2015</a:t>
             </a:fld>
             <a:endParaRPr lang="en-US"/>
           </a:p>
@@ -2097,7 +2105,7 @@
           <a:p>
             <a:fld id="{71B7A74D-6684-439E-81C1-4806B1B6E780}" type="datetimeFigureOut">
               <a:rPr lang="en-US" smtClean="0"/>
-              <a:t>11/28/2015</a:t>
+              <a:t>11/30/2015</a:t>
             </a:fld>
             <a:endParaRPr lang="en-US"/>
           </a:p>
@@ -2350,7 +2358,7 @@
           <a:p>
             <a:fld id="{71B7A74D-6684-439E-81C1-4806B1B6E780}" type="datetimeFigureOut">
               <a:rPr lang="en-US" smtClean="0"/>
-              <a:t>11/28/2015</a:t>
+              <a:t>11/30/2015</a:t>
             </a:fld>
             <a:endParaRPr lang="en-US"/>
           </a:p>
@@ -2563,7 +2571,7 @@
           <a:p>
             <a:fld id="{71B7A74D-6684-439E-81C1-4806B1B6E780}" type="datetimeFigureOut">
               <a:rPr lang="en-US" smtClean="0"/>
-              <a:t>11/28/2015</a:t>
+              <a:t>11/30/2015</a:t>
             </a:fld>
             <a:endParaRPr lang="en-US"/>
           </a:p>
@@ -2992,11 +3000,7 @@
           <a:p>
             <a:r>
               <a:rPr lang="en-US" dirty="0" smtClean="0"/>
-              <a:t>Authentication mechanisms for Internet of Things (IOT) objects and other alternatives such as </a:t>
-            </a:r>
-            <a:r>
-              <a:rPr lang="en-US" dirty="0" smtClean="0"/>
-              <a:t>Peer to Peer</a:t>
+              <a:t>Authentication mechanisms for Internet of Things (IOT) objects and other alternatives such as Peer to Peer</a:t>
             </a:r>
             <a:endParaRPr lang="en-US" dirty="0"/>
           </a:p>
@@ -3174,7 +3178,6 @@
               <a:rPr lang="en-US" dirty="0" smtClean="0"/>
               <a:t>Powerline</a:t>
             </a:r>
-            <a:endParaRPr lang="en-US" dirty="0" smtClean="0"/>
           </a:p>
           <a:p>
             <a:pPr marL="800100" lvl="1" indent="-342900" algn="l">
@@ -3182,8 +3185,8 @@
               <a:buChar char="o"/>
             </a:pPr>
             <a:r>
-              <a:rPr lang="en-US" dirty="0" err="1" smtClean="0"/>
-              <a:t>WiFi</a:t>
+              <a:rPr lang="en-US" dirty="0" smtClean="0"/>
+              <a:t>Bluetooth</a:t>
             </a:r>
             <a:endParaRPr lang="en-US" dirty="0"/>
           </a:p>
@@ -3194,9 +3197,16 @@
             </a:pPr>
             <a:r>
               <a:rPr lang="en-US" dirty="0" smtClean="0"/>
-              <a:t>Bluetooth</a:t>
-            </a:r>
-            <a:endParaRPr lang="en-US" dirty="0"/>
+              <a:t>Other </a:t>
+            </a:r>
+            <a:r>
+              <a:rPr lang="en-US" dirty="0"/>
+              <a:t>radio frequency (RF) </a:t>
+            </a:r>
+            <a:r>
+              <a:rPr lang="en-US" dirty="0"/>
+              <a:t>protocols</a:t>
+            </a:r>
           </a:p>
           <a:p>
             <a:pPr marL="800100" lvl="1" indent="-342900" algn="l">
@@ -3204,13 +3214,14 @@
               <a:buChar char="o"/>
             </a:pPr>
             <a:r>
-              <a:rPr lang="en-US" dirty="0" smtClean="0"/>
-              <a:t>Other </a:t>
-            </a:r>
-            <a:r>
-              <a:rPr lang="en-US" dirty="0"/>
-              <a:t>radio frequency (RF) protocols </a:t>
-            </a:r>
+              <a:rPr lang="en-US" dirty="0" err="1" smtClean="0"/>
+              <a:t>WiFi</a:t>
+            </a:r>
+            <a:r>
+              <a:rPr lang="en-US" dirty="0" smtClean="0"/>
+              <a:t> </a:t>
+            </a:r>
+            <a:endParaRPr lang="en-US" dirty="0"/>
           </a:p>
           <a:p>
             <a:pPr marL="800100" lvl="1" indent="-342900" algn="l">
@@ -3294,7 +3305,9 @@
         </p:nvSpPr>
         <p:spPr/>
         <p:txBody>
-          <a:bodyPr/>
+          <a:bodyPr>
+            <a:normAutofit lnSpcReduction="10000"/>
+          </a:bodyPr>
           <a:lstStyle/>
           <a:p>
             <a:pPr marL="342900" indent="-342900"/>
@@ -3329,7 +3342,26 @@
             <a:pPr marL="800100" lvl="1" indent="-342900"/>
             <a:r>
               <a:rPr lang="en-US" dirty="0" smtClean="0"/>
-              <a:t>Elliptic Curve Cryptography (ECC) based</a:t>
+              <a:t>Elliptic Curve Cryptography (ECC) </a:t>
+            </a:r>
+            <a:r>
+              <a:rPr lang="en-US" dirty="0" smtClean="0"/>
+              <a:t>based</a:t>
+            </a:r>
+          </a:p>
+          <a:p>
+            <a:pPr marL="1257300" lvl="2" indent="-342900"/>
+            <a:r>
+              <a:rPr lang="en-US" dirty="0" smtClean="0"/>
+              <a:t>Using Datagram </a:t>
+            </a:r>
+            <a:r>
+              <a:rPr lang="en-US" dirty="0"/>
+              <a:t>Transport Layer Security (DTLS</a:t>
+            </a:r>
+            <a:r>
+              <a:rPr lang="en-US" dirty="0" smtClean="0"/>
+              <a:t>)</a:t>
             </a:r>
             <a:endParaRPr lang="en-US" dirty="0"/>
           </a:p>
@@ -3337,30 +3369,18 @@
             <a:pPr marL="800100" lvl="1" indent="-342900"/>
             <a:r>
               <a:rPr lang="en-US" dirty="0" smtClean="0"/>
-              <a:t>Primary </a:t>
-            </a:r>
-            <a:r>
-              <a:rPr lang="en-US" dirty="0" smtClean="0"/>
-              <a:t>Key Infrastructure (P</a:t>
-            </a:r>
-            <a:r>
-              <a:rPr lang="en-US" dirty="0" smtClean="0"/>
-              <a:t>KI) Based</a:t>
+              <a:t>Primary Key Infrastructure (PKI) Based</a:t>
             </a:r>
           </a:p>
           <a:p>
             <a:pPr marL="800100" lvl="1" indent="-342900"/>
             <a:r>
               <a:rPr lang="en-US" dirty="0" smtClean="0"/>
-              <a:t>Datagram Transport Layer Security (DTLS) Based</a:t>
-            </a:r>
-            <a:endParaRPr lang="en-US" dirty="0" smtClean="0"/>
-          </a:p>
-          <a:p>
-            <a:pPr marL="800100" lvl="1" indent="-342900"/>
-            <a:r>
-              <a:rPr lang="en-US" dirty="0" smtClean="0"/>
-              <a:t>FIDO (Fast </a:t>
+              <a:t>FIDO </a:t>
+            </a:r>
+            <a:r>
+              <a:rPr lang="en-US" dirty="0" smtClean="0"/>
+              <a:t>(Fast </a:t>
             </a:r>
             <a:r>
               <a:rPr lang="en-US" dirty="0" err="1" smtClean="0"/>
@@ -3368,8 +3388,37 @@
             </a:r>
             <a:r>
               <a:rPr lang="en-US" dirty="0" smtClean="0"/>
-              <a:t> Online) Alliance developed</a:t>
-            </a:r>
+              <a:t> Online) Alliance </a:t>
+            </a:r>
+            <a:r>
+              <a:rPr lang="en-US" dirty="0" smtClean="0"/>
+              <a:t>developed</a:t>
+            </a:r>
+          </a:p>
+          <a:p>
+            <a:r>
+              <a:rPr lang="en-US" dirty="0"/>
+              <a:t>Device identity for </a:t>
+            </a:r>
+            <a:r>
+              <a:rPr lang="en-US" dirty="0" err="1"/>
+              <a:t>IoT</a:t>
+            </a:r>
+            <a:endParaRPr lang="en-US" sz="2400" dirty="0"/>
+          </a:p>
+          <a:p>
+            <a:r>
+              <a:rPr lang="en-US" dirty="0"/>
+              <a:t>User Identity for </a:t>
+            </a:r>
+            <a:r>
+              <a:rPr lang="en-US" dirty="0" err="1"/>
+              <a:t>IoT</a:t>
+            </a:r>
+            <a:endParaRPr lang="en-US" dirty="0"/>
+          </a:p>
+          <a:p>
+            <a:pPr marL="800100" lvl="1" indent="-342900"/>
             <a:endParaRPr lang="en-US" dirty="0" smtClean="0"/>
           </a:p>
         </p:txBody>
@@ -3421,7 +3470,7 @@
           <a:p>
             <a:r>
               <a:rPr lang="en-US" dirty="0" smtClean="0"/>
-              <a:t>FIDO Alliance Standards</a:t>
+              <a:t>PKI Based</a:t>
             </a:r>
             <a:endParaRPr lang="en-US" dirty="0"/>
           </a:p>
@@ -3443,23 +3492,56 @@
           <a:lstStyle/>
           <a:p>
             <a:r>
-              <a:rPr lang="en-US" dirty="0" smtClean="0"/>
-              <a:t>Universal 2nd Factor (U2F)</a:t>
-            </a:r>
-          </a:p>
-          <a:p>
-            <a:r>
-              <a:rPr lang="en-US" dirty="0" smtClean="0"/>
-              <a:t>Universal Authentication Framework (UAF)</a:t>
-            </a:r>
-            <a:endParaRPr lang="en-US" dirty="0"/>
+              <a:rPr lang="en-US" dirty="0"/>
+              <a:t>	Traditional model Comprising of digital certificates and </a:t>
+            </a:r>
+            <a:r>
+              <a:rPr lang="en-US" dirty="0" smtClean="0"/>
+              <a:t>	Certificate </a:t>
+            </a:r>
+            <a:r>
+              <a:rPr lang="en-US" dirty="0"/>
+              <a:t>Authorities (CA)</a:t>
+            </a:r>
+          </a:p>
+          <a:p>
+            <a:r>
+              <a:rPr lang="en-US" dirty="0"/>
+              <a:t>	Due to resource constraints many implementations of a subset of </a:t>
+            </a:r>
+            <a:r>
+              <a:rPr lang="en-US" dirty="0" smtClean="0"/>
+              <a:t>	traditional </a:t>
+            </a:r>
+            <a:r>
+              <a:rPr lang="en-US" dirty="0"/>
+              <a:t>PKI</a:t>
+            </a:r>
+          </a:p>
+          <a:p>
+            <a:r>
+              <a:rPr lang="en-US" dirty="0"/>
+              <a:t>	Tendency to use customized CA infrastructures depending upon </a:t>
+            </a:r>
+            <a:r>
+              <a:rPr lang="en-US" dirty="0" smtClean="0"/>
+              <a:t>	the </a:t>
+            </a:r>
+            <a:r>
+              <a:rPr lang="en-US" dirty="0" err="1"/>
+              <a:t>IoT</a:t>
+            </a:r>
+            <a:r>
+              <a:rPr lang="en-US" dirty="0"/>
+              <a:t> system size and scope</a:t>
+            </a:r>
           </a:p>
         </p:txBody>
       </p:sp>
     </p:spTree>
     <p:extLst>
       <p:ext uri="{BB962C8B-B14F-4D97-AF65-F5344CB8AC3E}">
-        <p14:creationId xmlns:p14="http://schemas.microsoft.com/office/powerpoint/2010/main" val="3107595229"/>
+        <p14:creationId xmlns:p14="http://schemas.microsoft.com/office/powerpoint/2010/main" val="704007874"/>
       </p:ext>
     </p:extLst>
   </p:cSld>
@@ -3503,6 +3585,195 @@
           <a:p>
             <a:r>
               <a:rPr lang="en-US" dirty="0" smtClean="0"/>
+              <a:t>FIDO Alliance Standards</a:t>
+            </a:r>
+            <a:endParaRPr lang="en-US" dirty="0"/>
+          </a:p>
+        </p:txBody>
+      </p:sp>
+      <p:sp>
+        <p:nvSpPr>
+          <p:cNvPr id="3" name="Content Placeholder 2"/>
+          <p:cNvSpPr>
+            <a:spLocks noGrp="1"/>
+          </p:cNvSpPr>
+          <p:nvPr>
+            <p:ph idx="1"/>
+          </p:nvPr>
+        </p:nvSpPr>
+        <p:spPr>
+          <a:xfrm>
+            <a:off x="838200" y="1383323"/>
+            <a:ext cx="10515600" cy="4793640"/>
+          </a:xfrm>
+        </p:spPr>
+        <p:txBody>
+          <a:bodyPr>
+            <a:normAutofit fontScale="85000" lnSpcReduction="20000"/>
+          </a:bodyPr>
+          <a:lstStyle/>
+          <a:p>
+            <a:r>
+              <a:rPr lang="en-US" dirty="0" smtClean="0"/>
+              <a:t>Universal 2nd Factor (U2F</a:t>
+            </a:r>
+            <a:r>
+              <a:rPr lang="en-US" dirty="0" smtClean="0"/>
+              <a:t>)</a:t>
+            </a:r>
+          </a:p>
+          <a:p>
+            <a:pPr lvl="1"/>
+            <a:r>
+              <a:rPr lang="en-US" dirty="0" smtClean="0"/>
+              <a:t>Allows </a:t>
+            </a:r>
+            <a:r>
+              <a:rPr lang="en-US" dirty="0"/>
+              <a:t>online services to augment the security of their existing password infrastructure by adding a strong second factor to user login. </a:t>
+            </a:r>
+            <a:endParaRPr lang="en-US" dirty="0" smtClean="0"/>
+          </a:p>
+          <a:p>
+            <a:pPr lvl="1"/>
+            <a:r>
+              <a:rPr lang="en-US" dirty="0" smtClean="0"/>
+              <a:t>During </a:t>
+            </a:r>
+            <a:r>
+              <a:rPr lang="en-US" dirty="0"/>
+              <a:t>registration and authentication, the user presents the second factor by simply pressing a button on a USB device or tapping over </a:t>
+            </a:r>
+            <a:r>
+              <a:rPr lang="en-US" dirty="0" smtClean="0"/>
+              <a:t>NFC.</a:t>
+            </a:r>
+            <a:r>
+              <a:rPr lang="en-US" dirty="0"/>
+              <a:t> </a:t>
+            </a:r>
+            <a:endParaRPr lang="en-US" dirty="0" smtClean="0"/>
+          </a:p>
+          <a:p>
+            <a:pPr lvl="1"/>
+            <a:r>
+              <a:rPr lang="en-US" dirty="0" smtClean="0"/>
+              <a:t>The </a:t>
+            </a:r>
+            <a:r>
+              <a:rPr lang="en-US" dirty="0"/>
+              <a:t>strong second factor allows the service to simplify its passwords (e.g. 4--digit PIN) without compromising security. </a:t>
+            </a:r>
+          </a:p>
+          <a:p>
+            <a:pPr lvl="1"/>
+            <a:endParaRPr lang="en-US" dirty="0" smtClean="0"/>
+          </a:p>
+          <a:p>
+            <a:r>
+              <a:rPr lang="en-US" dirty="0" smtClean="0"/>
+              <a:t>Universal Authentication Framework (UAF</a:t>
+            </a:r>
+            <a:r>
+              <a:rPr lang="en-US" dirty="0" smtClean="0"/>
+              <a:t>)</a:t>
+            </a:r>
+          </a:p>
+          <a:p>
+            <a:pPr lvl="1"/>
+            <a:r>
+              <a:rPr lang="en-US" dirty="0"/>
+              <a:t>The UAF protocol allows online services to offer password-less and multi-factor security. </a:t>
+            </a:r>
+            <a:endParaRPr lang="en-US" dirty="0" smtClean="0"/>
+          </a:p>
+          <a:p>
+            <a:pPr lvl="1"/>
+            <a:r>
+              <a:rPr lang="en-US" dirty="0" smtClean="0"/>
+              <a:t>The </a:t>
+            </a:r>
+            <a:r>
+              <a:rPr lang="en-US" dirty="0"/>
+              <a:t>user registers their device to the online service by selecting a local authentication mechanism such as swiping a finger, looking at the camera, speaking into the mic, entering a PIN, etc. </a:t>
+            </a:r>
+            <a:endParaRPr lang="en-US" dirty="0" smtClean="0"/>
+          </a:p>
+          <a:p>
+            <a:pPr lvl="1"/>
+            <a:r>
+              <a:rPr lang="en-US" dirty="0" smtClean="0"/>
+              <a:t>Once </a:t>
+            </a:r>
+            <a:r>
+              <a:rPr lang="en-US" dirty="0"/>
+              <a:t>registered, the user simply repeats the local authentication action whenever they need to authenticate to the service. The user no longer needs to enter their password when authenticating from that device. </a:t>
+            </a:r>
+            <a:endParaRPr lang="en-US" dirty="0" smtClean="0"/>
+          </a:p>
+          <a:p>
+            <a:pPr lvl="1"/>
+            <a:r>
+              <a:rPr lang="en-US" dirty="0" smtClean="0"/>
+              <a:t>UAF </a:t>
+            </a:r>
+            <a:r>
+              <a:rPr lang="en-US" dirty="0"/>
+              <a:t>also allows experiences that combine multiple authentication mechanisms such as fingerprint + PIN. </a:t>
+            </a:r>
+          </a:p>
+          <a:p>
+            <a:endParaRPr lang="en-US" dirty="0"/>
+          </a:p>
+        </p:txBody>
+      </p:sp>
+    </p:spTree>
+    <p:extLst>
+      <p:ext uri="{BB962C8B-B14F-4D97-AF65-F5344CB8AC3E}">
+        <p14:creationId xmlns:p14="http://schemas.microsoft.com/office/powerpoint/2010/main" val="3107595229"/>
+      </p:ext>
+    </p:extLst>
+  </p:cSld>
+  <p:clrMapOvr>
+    <a:masterClrMapping/>
+  </p:clrMapOvr>
+</p:sld>
+</file>
+
+<file path=ppt/slides/slide6.xml><?xml version="1.0" encoding="utf-8"?>
+<p:sld xmlns:a="http://schemas.openxmlformats.org/drawingml/2006/main" xmlns:r="http://schemas.openxmlformats.org/officeDocument/2006/relationships" xmlns:p="http://schemas.openxmlformats.org/presentationml/2006/main">
+  <p:cSld>
+    <p:spTree>
+      <p:nvGrpSpPr>
+        <p:cNvPr id="1" name=""/>
+        <p:cNvGrpSpPr/>
+        <p:nvPr/>
+      </p:nvGrpSpPr>
+      <p:grpSpPr>
+        <a:xfrm>
+          <a:off x="0" y="0"/>
+          <a:ext cx="0" cy="0"/>
+          <a:chOff x="0" y="0"/>
+          <a:chExt cx="0" cy="0"/>
+        </a:xfrm>
+      </p:grpSpPr>
+      <p:sp>
+        <p:nvSpPr>
+          <p:cNvPr id="2" name="Title 1"/>
+          <p:cNvSpPr>
+            <a:spLocks noGrp="1"/>
+          </p:cNvSpPr>
+          <p:nvPr>
+            <p:ph type="title"/>
+          </p:nvPr>
+        </p:nvSpPr>
+        <p:spPr/>
+        <p:txBody>
+          <a:bodyPr/>
+          <a:lstStyle/>
+          <a:p>
+            <a:r>
+              <a:rPr lang="en-US" dirty="0" smtClean="0"/>
               <a:t>Alternative </a:t>
             </a:r>
             <a:r>
@@ -3652,6 +3923,185 @@
     <p:extLst>
       <p:ext uri="{BB962C8B-B14F-4D97-AF65-F5344CB8AC3E}">
         <p14:creationId xmlns:p14="http://schemas.microsoft.com/office/powerpoint/2010/main" val="3538559807"/>
+      </p:ext>
+    </p:extLst>
+  </p:cSld>
+  <p:clrMapOvr>
+    <a:masterClrMapping/>
+  </p:clrMapOvr>
+</p:sld>
+</file>
+
+<file path=ppt/slides/slide7.xml><?xml version="1.0" encoding="utf-8"?>
+<p:sld xmlns:a="http://schemas.openxmlformats.org/drawingml/2006/main" xmlns:r="http://schemas.openxmlformats.org/officeDocument/2006/relationships" xmlns:p="http://schemas.openxmlformats.org/presentationml/2006/main">
+  <p:cSld>
+    <p:spTree>
+      <p:nvGrpSpPr>
+        <p:cNvPr id="1" name=""/>
+        <p:cNvGrpSpPr/>
+        <p:nvPr/>
+      </p:nvGrpSpPr>
+      <p:grpSpPr>
+        <a:xfrm>
+          <a:off x="0" y="0"/>
+          <a:ext cx="0" cy="0"/>
+          <a:chOff x="0" y="0"/>
+          <a:chExt cx="0" cy="0"/>
+        </a:xfrm>
+      </p:grpSpPr>
+      <p:sp>
+        <p:nvSpPr>
+          <p:cNvPr id="2" name="Title 1"/>
+          <p:cNvSpPr>
+            <a:spLocks noGrp="1"/>
+          </p:cNvSpPr>
+          <p:nvPr>
+            <p:ph type="title"/>
+          </p:nvPr>
+        </p:nvSpPr>
+        <p:spPr/>
+        <p:txBody>
+          <a:bodyPr/>
+          <a:lstStyle/>
+          <a:p>
+            <a:r>
+              <a:rPr lang="en-US" b="1" dirty="0"/>
+              <a:t>Device Location Authentication</a:t>
+            </a:r>
+            <a:endParaRPr lang="en-US" dirty="0"/>
+          </a:p>
+        </p:txBody>
+      </p:sp>
+      <p:sp>
+        <p:nvSpPr>
+          <p:cNvPr id="3" name="Content Placeholder 2"/>
+          <p:cNvSpPr>
+            <a:spLocks noGrp="1"/>
+          </p:cNvSpPr>
+          <p:nvPr>
+            <p:ph idx="1"/>
+          </p:nvPr>
+        </p:nvSpPr>
+        <p:spPr/>
+        <p:txBody>
+          <a:bodyPr/>
+          <a:lstStyle/>
+          <a:p>
+            <a:r>
+              <a:rPr lang="en-US" dirty="0" smtClean="0"/>
+              <a:t>Uses cellular</a:t>
+            </a:r>
+            <a:r>
+              <a:rPr lang="en-US" dirty="0"/>
+              <a:t>, Wi-Fi, satellite, and other available data sets to retrieve the user’s location via their mobile </a:t>
+            </a:r>
+            <a:r>
+              <a:rPr lang="en-US" dirty="0" smtClean="0"/>
+              <a:t>device</a:t>
+            </a:r>
+          </a:p>
+          <a:p>
+            <a:r>
+              <a:rPr lang="en-US" dirty="0" smtClean="0"/>
+              <a:t>Assess </a:t>
+            </a:r>
+            <a:r>
+              <a:rPr lang="en-US" dirty="0"/>
+              <a:t>whether the user’s device has suffered any kind of security breach. </a:t>
+            </a:r>
+            <a:endParaRPr lang="en-US" dirty="0" smtClean="0"/>
+          </a:p>
+          <a:p>
+            <a:r>
+              <a:rPr lang="en-US" dirty="0" smtClean="0"/>
+              <a:t>The </a:t>
+            </a:r>
+            <a:r>
+              <a:rPr lang="en-US" dirty="0"/>
+              <a:t>two systems then algorithmically come up with a Trust Score indicating the likelihood that the device being used is actually where it’s supposed to be.</a:t>
+            </a:r>
+          </a:p>
+        </p:txBody>
+      </p:sp>
+    </p:spTree>
+    <p:extLst>
+      <p:ext uri="{BB962C8B-B14F-4D97-AF65-F5344CB8AC3E}">
+        <p14:creationId xmlns:p14="http://schemas.microsoft.com/office/powerpoint/2010/main" val="2522191140"/>
+      </p:ext>
+    </p:extLst>
+  </p:cSld>
+  <p:clrMapOvr>
+    <a:masterClrMapping/>
+  </p:clrMapOvr>
+</p:sld>
+</file>
+
+<file path=ppt/slides/slide8.xml><?xml version="1.0" encoding="utf-8"?>
+<p:sld xmlns:a="http://schemas.openxmlformats.org/drawingml/2006/main" xmlns:r="http://schemas.openxmlformats.org/officeDocument/2006/relationships" xmlns:p="http://schemas.openxmlformats.org/presentationml/2006/main">
+  <p:cSld>
+    <p:spTree>
+      <p:nvGrpSpPr>
+        <p:cNvPr id="1" name=""/>
+        <p:cNvGrpSpPr/>
+        <p:nvPr/>
+      </p:nvGrpSpPr>
+      <p:grpSpPr>
+        <a:xfrm>
+          <a:off x="0" y="0"/>
+          <a:ext cx="0" cy="0"/>
+          <a:chOff x="0" y="0"/>
+          <a:chExt cx="0" cy="0"/>
+        </a:xfrm>
+      </p:grpSpPr>
+      <p:sp>
+        <p:nvSpPr>
+          <p:cNvPr id="2" name="Title 1"/>
+          <p:cNvSpPr>
+            <a:spLocks noGrp="1"/>
+          </p:cNvSpPr>
+          <p:nvPr>
+            <p:ph type="title"/>
+          </p:nvPr>
+        </p:nvSpPr>
+        <p:spPr/>
+        <p:txBody>
+          <a:bodyPr/>
+          <a:lstStyle/>
+          <a:p>
+            <a:endParaRPr lang="en-US" dirty="0"/>
+          </a:p>
+        </p:txBody>
+      </p:sp>
+      <p:sp>
+        <p:nvSpPr>
+          <p:cNvPr id="3" name="Content Placeholder 2"/>
+          <p:cNvSpPr>
+            <a:spLocks noGrp="1"/>
+          </p:cNvSpPr>
+          <p:nvPr>
+            <p:ph idx="1"/>
+          </p:nvPr>
+        </p:nvSpPr>
+        <p:spPr/>
+        <p:txBody>
+          <a:bodyPr/>
+          <a:lstStyle/>
+          <a:p>
+            <a:pPr marL="0" indent="0" algn="ctr">
+              <a:buNone/>
+            </a:pPr>
+            <a:r>
+              <a:rPr lang="en-US" dirty="0" smtClean="0"/>
+              <a:t>Questions?</a:t>
+            </a:r>
+            <a:endParaRPr lang="en-US" dirty="0"/>
+          </a:p>
+        </p:txBody>
+      </p:sp>
+    </p:spTree>
+    <p:extLst>
+      <p:ext uri="{BB962C8B-B14F-4D97-AF65-F5344CB8AC3E}">
+        <p14:creationId xmlns:p14="http://schemas.microsoft.com/office/powerpoint/2010/main" val="3624565662"/>
       </p:ext>
     </p:extLst>
   </p:cSld>

</xml_diff>